<commit_message>
Ejemplo 1 de fisicas
</commit_message>
<xml_diff>
--- a/Trasparencias/Fisicas.pptx
+++ b/Trasparencias/Fisicas.pptx
@@ -213,7 +213,7 @@
           <a:effectLst/>
           <a:extLst>
             <a:ext uri="{91240B29-F687-4f45-9708-019B960494DF}">
-              <a14:hiddenLine xmlns:a14="http://schemas.microsoft.com/office/drawing/2010/main" xmlns="" w="9525">
+              <a14:hiddenLine xmlns="" xmlns:a14="http://schemas.microsoft.com/office/drawing/2010/main" w="9525">
                 <a:solidFill>
                   <a:srgbClr val="000000"/>
                 </a:solidFill>
@@ -406,7 +406,7 @@
             <a:fld id="{B61BEF0D-F0BB-DE4B-95CE-6DB70DBA9567}" type="datetimeFigureOut">
               <a:rPr lang="en-US" smtClean="0"/>
               <a:pPr/>
-              <a:t>4/17/2016</a:t>
+              <a:t>4/21/2016</a:t>
             </a:fld>
             <a:endParaRPr lang="en-US" dirty="0"/>
           </a:p>
@@ -725,7 +725,7 @@
             <a:fld id="{B61BEF0D-F0BB-DE4B-95CE-6DB70DBA9567}" type="datetimeFigureOut">
               <a:rPr lang="en-US" smtClean="0"/>
               <a:pPr/>
-              <a:t>4/17/2016</a:t>
+              <a:t>4/21/2016</a:t>
             </a:fld>
             <a:endParaRPr lang="en-US" dirty="0"/>
           </a:p>
@@ -1214,7 +1214,7 @@
             <a:fld id="{B61BEF0D-F0BB-DE4B-95CE-6DB70DBA9567}" type="datetimeFigureOut">
               <a:rPr lang="en-US" smtClean="0"/>
               <a:pPr/>
-              <a:t>4/17/2016</a:t>
+              <a:t>4/21/2016</a:t>
             </a:fld>
             <a:endParaRPr lang="en-US" dirty="0"/>
           </a:p>
@@ -1584,7 +1584,7 @@
             <a:fld id="{B61BEF0D-F0BB-DE4B-95CE-6DB70DBA9567}" type="datetimeFigureOut">
               <a:rPr lang="en-US" smtClean="0"/>
               <a:pPr/>
-              <a:t>4/17/2016</a:t>
+              <a:t>4/21/2016</a:t>
             </a:fld>
             <a:endParaRPr lang="en-US" dirty="0"/>
           </a:p>
@@ -1739,7 +1739,7 @@
           <a:ln/>
           <a:extLst>
             <a:ext uri="{91240B29-F687-4f45-9708-019B960494DF}">
-              <a14:hiddenLine xmlns:a14="http://schemas.microsoft.com/office/drawing/2010/main" xmlns="" w="9525">
+              <a14:hiddenLine xmlns="" xmlns:a14="http://schemas.microsoft.com/office/drawing/2010/main" w="9525">
                 <a:solidFill>
                   <a:srgbClr val="000000"/>
                 </a:solidFill>
@@ -1858,7 +1858,7 @@
             <a:fld id="{B61BEF0D-F0BB-DE4B-95CE-6DB70DBA9567}" type="datetimeFigureOut">
               <a:rPr lang="en-US" smtClean="0"/>
               <a:pPr/>
-              <a:t>4/17/2016</a:t>
+              <a:t>4/21/2016</a:t>
             </a:fld>
             <a:endParaRPr lang="en-US" dirty="0"/>
           </a:p>
@@ -2015,7 +2015,7 @@
           <a:ln/>
           <a:extLst>
             <a:ext uri="{91240B29-F687-4f45-9708-019B960494DF}">
-              <a14:hiddenLine xmlns:a14="http://schemas.microsoft.com/office/drawing/2010/main" xmlns="" w="9525">
+              <a14:hiddenLine xmlns="" xmlns:a14="http://schemas.microsoft.com/office/drawing/2010/main" w="9525">
                 <a:solidFill>
                   <a:srgbClr val="000000"/>
                 </a:solidFill>
@@ -2144,7 +2144,7 @@
             <a:fld id="{B61BEF0D-F0BB-DE4B-95CE-6DB70DBA9567}" type="datetimeFigureOut">
               <a:rPr lang="en-US" smtClean="0"/>
               <a:pPr/>
-              <a:t>4/17/2016</a:t>
+              <a:t>4/21/2016</a:t>
             </a:fld>
             <a:endParaRPr lang="en-US" dirty="0"/>
           </a:p>
@@ -2299,7 +2299,7 @@
           <a:ln/>
           <a:extLst>
             <a:ext uri="{91240B29-F687-4f45-9708-019B960494DF}">
-              <a14:hiddenLine xmlns:a14="http://schemas.microsoft.com/office/drawing/2010/main" xmlns="" w="9525">
+              <a14:hiddenLine xmlns="" xmlns:a14="http://schemas.microsoft.com/office/drawing/2010/main" w="9525">
                 <a:solidFill>
                   <a:srgbClr val="000000"/>
                 </a:solidFill>
@@ -2428,7 +2428,7 @@
             <a:fld id="{B61BEF0D-F0BB-DE4B-95CE-6DB70DBA9567}" type="datetimeFigureOut">
               <a:rPr lang="en-US" smtClean="0"/>
               <a:pPr/>
-              <a:t>4/17/2016</a:t>
+              <a:t>4/21/2016</a:t>
             </a:fld>
             <a:endParaRPr lang="en-US" dirty="0"/>
           </a:p>
@@ -2773,7 +2773,7 @@
             <a:fld id="{B61BEF0D-F0BB-DE4B-95CE-6DB70DBA9567}" type="datetimeFigureOut">
               <a:rPr lang="en-US" smtClean="0"/>
               <a:pPr/>
-              <a:t>4/17/2016</a:t>
+              <a:t>4/21/2016</a:t>
             </a:fld>
             <a:endParaRPr lang="en-US" dirty="0"/>
           </a:p>
@@ -2928,7 +2928,7 @@
           <a:ln/>
           <a:extLst>
             <a:ext uri="{91240B29-F687-4f45-9708-019B960494DF}">
-              <a14:hiddenLine xmlns:a14="http://schemas.microsoft.com/office/drawing/2010/main" xmlns="" w="9525">
+              <a14:hiddenLine xmlns="" xmlns:a14="http://schemas.microsoft.com/office/drawing/2010/main" w="9525">
                 <a:solidFill>
                   <a:srgbClr val="000000"/>
                 </a:solidFill>
@@ -3113,7 +3113,7 @@
             <a:fld id="{B61BEF0D-F0BB-DE4B-95CE-6DB70DBA9567}" type="datetimeFigureOut">
               <a:rPr lang="en-US" smtClean="0"/>
               <a:pPr/>
-              <a:t>4/17/2016</a:t>
+              <a:t>4/21/2016</a:t>
             </a:fld>
             <a:endParaRPr lang="en-US" dirty="0"/>
           </a:p>
@@ -3269,7 +3269,7 @@
           <a:ln/>
           <a:extLst>
             <a:ext uri="{91240B29-F687-4f45-9708-019B960494DF}">
-              <a14:hiddenLine xmlns:a14="http://schemas.microsoft.com/office/drawing/2010/main" xmlns="" w="9525">
+              <a14:hiddenLine xmlns="" xmlns:a14="http://schemas.microsoft.com/office/drawing/2010/main" w="9525">
                 <a:solidFill>
                   <a:srgbClr val="000000"/>
                 </a:solidFill>
@@ -3592,7 +3592,7 @@
             <a:fld id="{B61BEF0D-F0BB-DE4B-95CE-6DB70DBA9567}" type="datetimeFigureOut">
               <a:rPr lang="en-US" smtClean="0"/>
               <a:pPr/>
-              <a:t>4/17/2016</a:t>
+              <a:t>4/21/2016</a:t>
             </a:fld>
             <a:endParaRPr lang="en-US" dirty="0"/>
           </a:p>
@@ -3747,7 +3747,7 @@
           <a:ln/>
           <a:extLst>
             <a:ext uri="{91240B29-F687-4f45-9708-019B960494DF}">
-              <a14:hiddenLine xmlns:a14="http://schemas.microsoft.com/office/drawing/2010/main" xmlns="" w="9525">
+              <a14:hiddenLine xmlns="" xmlns:a14="http://schemas.microsoft.com/office/drawing/2010/main" w="9525">
                 <a:solidFill>
                   <a:srgbClr val="000000"/>
                 </a:solidFill>
@@ -3814,7 +3814,7 @@
             <a:fld id="{B61BEF0D-F0BB-DE4B-95CE-6DB70DBA9567}" type="datetimeFigureOut">
               <a:rPr lang="en-US" smtClean="0"/>
               <a:pPr/>
-              <a:t>4/17/2016</a:t>
+              <a:t>4/21/2016</a:t>
             </a:fld>
             <a:endParaRPr lang="en-US" dirty="0"/>
           </a:p>
@@ -3910,7 +3910,7 @@
             <a:fld id="{B61BEF0D-F0BB-DE4B-95CE-6DB70DBA9567}" type="datetimeFigureOut">
               <a:rPr lang="en-US" smtClean="0"/>
               <a:pPr/>
-              <a:t>4/17/2016</a:t>
+              <a:t>4/21/2016</a:t>
             </a:fld>
             <a:endParaRPr lang="en-US" dirty="0"/>
           </a:p>
@@ -4179,7 +4179,7 @@
           <a:ln/>
           <a:extLst>
             <a:ext uri="{91240B29-F687-4f45-9708-019B960494DF}">
-              <a14:hiddenLine xmlns:a14="http://schemas.microsoft.com/office/drawing/2010/main" xmlns="" w="9525">
+              <a14:hiddenLine xmlns="" xmlns:a14="http://schemas.microsoft.com/office/drawing/2010/main" w="9525">
                 <a:solidFill>
                   <a:srgbClr val="000000"/>
                 </a:solidFill>
@@ -4379,7 +4379,7 @@
             <a:fld id="{B61BEF0D-F0BB-DE4B-95CE-6DB70DBA9567}" type="datetimeFigureOut">
               <a:rPr lang="en-US" smtClean="0"/>
               <a:pPr/>
-              <a:t>4/17/2016</a:t>
+              <a:t>4/21/2016</a:t>
             </a:fld>
             <a:endParaRPr lang="en-US" dirty="0"/>
           </a:p>
@@ -4693,7 +4693,7 @@
             <a:fld id="{B61BEF0D-F0BB-DE4B-95CE-6DB70DBA9567}" type="datetimeFigureOut">
               <a:rPr lang="en-US" smtClean="0"/>
               <a:pPr/>
-              <a:t>4/17/2016</a:t>
+              <a:t>4/21/2016</a:t>
             </a:fld>
             <a:endParaRPr lang="en-US" dirty="0"/>
           </a:p>
@@ -4964,7 +4964,7 @@
             <a:fld id="{B61BEF0D-F0BB-DE4B-95CE-6DB70DBA9567}" type="datetimeFigureOut">
               <a:rPr lang="en-US" smtClean="0"/>
               <a:pPr/>
-              <a:t>4/17/2016</a:t>
+              <a:t>4/21/2016</a:t>
             </a:fld>
             <a:endParaRPr lang="en-US" dirty="0"/>
           </a:p>
@@ -5429,12 +5429,8 @@
           <a:lstStyle/>
           <a:p>
             <a:r>
-              <a:rPr lang="es-ES" dirty="0" err="1" smtClean="0"/>
-              <a:t>Fisicas</a:t>
-            </a:r>
-            <a:r>
               <a:rPr lang="es-ES" dirty="0" smtClean="0"/>
-              <a:t> </a:t>
+              <a:t>Físicas </a:t>
             </a:r>
             <a:r>
               <a:rPr lang="es-ES" dirty="0" smtClean="0"/>
@@ -5485,6 +5481,13 @@
   <p:clrMapOvr>
     <a:masterClrMapping/>
   </p:clrMapOvr>
+  <p:timing>
+    <p:tnLst>
+      <p:par>
+        <p:cTn id="1" dur="indefinite" restart="never" nodeType="tmRoot"/>
+      </p:par>
+    </p:tnLst>
+  </p:timing>
 </p:sld>
 </file>
 
@@ -5614,6 +5617,13 @@
       <p:transition spd="slow"/>
     </mc:Fallback>
   </mc:AlternateContent>
+  <p:timing>
+    <p:tnLst>
+      <p:par>
+        <p:cTn id="1" dur="indefinite" restart="never" nodeType="tmRoot"/>
+      </p:par>
+    </p:tnLst>
+  </p:timing>
 </p:sld>
 </file>
 
@@ -5717,11 +5727,7 @@
           <a:p>
             <a:r>
               <a:rPr lang="es-ES" dirty="0" smtClean="0"/>
-              <a:t>Tiene motores separados para las físicas en componente</a:t>
-            </a:r>
-            <a:r>
-              <a:rPr lang="es-ES" dirty="0" smtClean="0"/>
-              <a:t>s 2D y 3D.</a:t>
+              <a:t>Tiene motores separados para las físicas en componentes 2D y 3D.</a:t>
             </a:r>
           </a:p>
           <a:p>
@@ -5818,6 +5824,13 @@
   <p:clrMapOvr>
     <a:masterClrMapping/>
   </p:clrMapOvr>
+  <p:timing>
+    <p:tnLst>
+      <p:par>
+        <p:cTn id="1" dur="indefinite" restart="never" nodeType="tmRoot"/>
+      </p:par>
+    </p:tnLst>
+  </p:timing>
 </p:sld>
 </file>
 
@@ -5950,6 +5963,13 @@
   <p:clrMapOvr>
     <a:masterClrMapping/>
   </p:clrMapOvr>
+  <p:timing>
+    <p:tnLst>
+      <p:par>
+        <p:cTn id="1" dur="indefinite" restart="never" nodeType="tmRoot"/>
+      </p:par>
+    </p:tnLst>
+  </p:timing>
 </p:sld>
 </file>
 
@@ -6088,6 +6108,13 @@
   <p:clrMapOvr>
     <a:masterClrMapping/>
   </p:clrMapOvr>
+  <p:timing>
+    <p:tnLst>
+      <p:par>
+        <p:cTn id="1" dur="indefinite" restart="never" nodeType="tmRoot"/>
+      </p:par>
+    </p:tnLst>
+  </p:timing>
 </p:sld>
 </file>
 
@@ -6261,6 +6288,13 @@
   <p:clrMapOvr>
     <a:masterClrMapping/>
   </p:clrMapOvr>
+  <p:timing>
+    <p:tnLst>
+      <p:par>
+        <p:cTn id="1" dur="indefinite" restart="never" nodeType="tmRoot"/>
+      </p:par>
+    </p:tnLst>
+  </p:timing>
 </p:sld>
 </file>
 
@@ -6397,6 +6431,13 @@
   <p:clrMapOvr>
     <a:masterClrMapping/>
   </p:clrMapOvr>
+  <p:timing>
+    <p:tnLst>
+      <p:par>
+        <p:cTn id="1" dur="indefinite" restart="never" nodeType="tmRoot"/>
+      </p:par>
+    </p:tnLst>
+  </p:timing>
 </p:sld>
 </file>
 

</xml_diff>